<commit_message>
completed overview project files
</commit_message>
<xml_diff>
--- a/week5Project_MnA_tech_strategic_bus_analysis.pptx
+++ b/week5Project_MnA_tech_strategic_bus_analysis.pptx
@@ -120,6 +120,11 @@
       </a:defRPr>
     </a:lvl9pPr>
   </p:defaultTextStyle>
+  <p:extLst>
+    <p:ext uri="{EFAFB233-063F-42B5-8137-9DF3F51BA10A}">
+      <p15:sldGuideLst xmlns:p15="http://schemas.microsoft.com/office/powerpoint/2012/main"/>
+    </p:ext>
+  </p:extLst>
 </p:presentation>
 </file>
 
@@ -205,7 +210,7 @@
           <a:p>
             <a:fld id="{EE35BDE1-3B14-45C6-9CC2-51F0BB3F2131}" type="datetimeFigureOut">
               <a:rPr lang="en-US" smtClean="0"/>
-              <a:t>6/3/2022</a:t>
+              <a:t>6/10/2022</a:t>
             </a:fld>
             <a:endParaRPr lang="en-US"/>
           </a:p>
@@ -778,7 +783,7 @@
           <a:p>
             <a:fld id="{518B7617-BE91-49D8-907E-B776E7ACA81E}" type="datetimeFigureOut">
               <a:rPr lang="en-US" smtClean="0"/>
-              <a:t>6/3/2022</a:t>
+              <a:t>6/10/2022</a:t>
             </a:fld>
             <a:endParaRPr lang="en-US"/>
           </a:p>
@@ -948,7 +953,7 @@
           <a:p>
             <a:fld id="{518B7617-BE91-49D8-907E-B776E7ACA81E}" type="datetimeFigureOut">
               <a:rPr lang="en-US" smtClean="0"/>
-              <a:t>6/3/2022</a:t>
+              <a:t>6/10/2022</a:t>
             </a:fld>
             <a:endParaRPr lang="en-US"/>
           </a:p>
@@ -1128,7 +1133,7 @@
           <a:p>
             <a:fld id="{518B7617-BE91-49D8-907E-B776E7ACA81E}" type="datetimeFigureOut">
               <a:rPr lang="en-US" smtClean="0"/>
-              <a:t>6/3/2022</a:t>
+              <a:t>6/10/2022</a:t>
             </a:fld>
             <a:endParaRPr lang="en-US"/>
           </a:p>
@@ -1298,7 +1303,7 @@
           <a:p>
             <a:fld id="{518B7617-BE91-49D8-907E-B776E7ACA81E}" type="datetimeFigureOut">
               <a:rPr lang="en-US" smtClean="0"/>
-              <a:t>6/3/2022</a:t>
+              <a:t>6/10/2022</a:t>
             </a:fld>
             <a:endParaRPr lang="en-US"/>
           </a:p>
@@ -1544,7 +1549,7 @@
           <a:p>
             <a:fld id="{518B7617-BE91-49D8-907E-B776E7ACA81E}" type="datetimeFigureOut">
               <a:rPr lang="en-US" smtClean="0"/>
-              <a:t>6/3/2022</a:t>
+              <a:t>6/10/2022</a:t>
             </a:fld>
             <a:endParaRPr lang="en-US"/>
           </a:p>
@@ -1776,7 +1781,7 @@
           <a:p>
             <a:fld id="{518B7617-BE91-49D8-907E-B776E7ACA81E}" type="datetimeFigureOut">
               <a:rPr lang="en-US" smtClean="0"/>
-              <a:t>6/3/2022</a:t>
+              <a:t>6/10/2022</a:t>
             </a:fld>
             <a:endParaRPr lang="en-US"/>
           </a:p>
@@ -2143,7 +2148,7 @@
           <a:p>
             <a:fld id="{518B7617-BE91-49D8-907E-B776E7ACA81E}" type="datetimeFigureOut">
               <a:rPr lang="en-US" smtClean="0"/>
-              <a:t>6/3/2022</a:t>
+              <a:t>6/10/2022</a:t>
             </a:fld>
             <a:endParaRPr lang="en-US"/>
           </a:p>
@@ -2261,7 +2266,7 @@
           <a:p>
             <a:fld id="{518B7617-BE91-49D8-907E-B776E7ACA81E}" type="datetimeFigureOut">
               <a:rPr lang="en-US" smtClean="0"/>
-              <a:t>6/3/2022</a:t>
+              <a:t>6/10/2022</a:t>
             </a:fld>
             <a:endParaRPr lang="en-US"/>
           </a:p>
@@ -2356,7 +2361,7 @@
           <a:p>
             <a:fld id="{518B7617-BE91-49D8-907E-B776E7ACA81E}" type="datetimeFigureOut">
               <a:rPr lang="en-US" smtClean="0"/>
-              <a:t>6/3/2022</a:t>
+              <a:t>6/10/2022</a:t>
             </a:fld>
             <a:endParaRPr lang="en-US"/>
           </a:p>
@@ -2633,7 +2638,7 @@
           <a:p>
             <a:fld id="{518B7617-BE91-49D8-907E-B776E7ACA81E}" type="datetimeFigureOut">
               <a:rPr lang="en-US" smtClean="0"/>
-              <a:t>6/3/2022</a:t>
+              <a:t>6/10/2022</a:t>
             </a:fld>
             <a:endParaRPr lang="en-US"/>
           </a:p>
@@ -2886,7 +2891,7 @@
           <a:p>
             <a:fld id="{518B7617-BE91-49D8-907E-B776E7ACA81E}" type="datetimeFigureOut">
               <a:rPr lang="en-US" smtClean="0"/>
-              <a:t>6/3/2022</a:t>
+              <a:t>6/10/2022</a:t>
             </a:fld>
             <a:endParaRPr lang="en-US"/>
           </a:p>
@@ -3099,7 +3104,7 @@
           <a:p>
             <a:fld id="{518B7617-BE91-49D8-907E-B776E7ACA81E}" type="datetimeFigureOut">
               <a:rPr lang="en-US" smtClean="0"/>
-              <a:t>6/3/2022</a:t>
+              <a:t>6/10/2022</a:t>
             </a:fld>
             <a:endParaRPr lang="en-US"/>
           </a:p>
@@ -3553,17 +3558,21 @@
           <a:p>
             <a:r>
               <a:rPr lang="en-US" dirty="0" smtClean="0"/>
-              <a:t>Business intelligence strategy perspective</a:t>
-            </a:r>
-          </a:p>
-          <a:p>
+              <a:t>Business </a:t>
+            </a:r>
             <a:r>
               <a:rPr lang="en-US" dirty="0" smtClean="0"/>
-              <a:t>Google, IBM, Microsoft, Apple, Facebook, Yahoo and </a:t>
+              <a:t>intelligence: </a:t>
             </a:r>
             <a:r>
               <a:rPr lang="en-US" dirty="0" smtClean="0"/>
-              <a:t>Twitter</a:t>
+              <a:t>strategy perspective</a:t>
+            </a:r>
+          </a:p>
+          <a:p>
+            <a:r>
+              <a:rPr lang="en-US" dirty="0" smtClean="0"/>
+              <a:t>Google, IBM, Microsoft, Apple, Facebook, Yahoo and Twitter</a:t>
             </a:r>
           </a:p>
           <a:p>
@@ -4608,11 +4617,11 @@
   <p:clrMapOvr>
     <a:masterClrMapping/>
   </p:clrMapOvr>
-  <mc:AlternateContent xmlns:mc="http://schemas.openxmlformats.org/markup-compatibility/2006">
-    <mc:Choice xmlns:p14="http://schemas.microsoft.com/office/powerpoint/2010/main" Requires="p14">
+  <mc:AlternateContent xmlns:mc="http://schemas.openxmlformats.org/markup-compatibility/2006" xmlns:p14="http://schemas.microsoft.com/office/powerpoint/2010/main">
+    <mc:Choice Requires="p14">
       <p:transition spd="slow" p14:dur="2000"/>
     </mc:Choice>
-    <mc:Fallback>
+    <mc:Fallback xmlns="">
       <p:transition spd="slow"/>
     </mc:Fallback>
   </mc:AlternateContent>
@@ -4715,11 +4724,11 @@
   <p:clrMapOvr>
     <a:masterClrMapping/>
   </p:clrMapOvr>
-  <mc:AlternateContent xmlns:mc="http://schemas.openxmlformats.org/markup-compatibility/2006">
-    <mc:Choice xmlns:p14="http://schemas.microsoft.com/office/powerpoint/2010/main" Requires="p14">
+  <mc:AlternateContent xmlns:mc="http://schemas.openxmlformats.org/markup-compatibility/2006" xmlns:p14="http://schemas.microsoft.com/office/powerpoint/2010/main">
+    <mc:Choice Requires="p14">
       <p:transition spd="slow" p14:dur="2000"/>
     </mc:Choice>
-    <mc:Fallback>
+    <mc:Fallback xmlns="">
       <p:transition spd="slow"/>
     </mc:Fallback>
   </mc:AlternateContent>

</xml_diff>